<commit_message>
issues and READ me are updated.
</commit_message>
<xml_diff>
--- a/prj_github_usage/pic/git_pictures.pptx
+++ b/prj_github_usage/pic/git_pictures.pptx
@@ -12,6 +12,7 @@
     <p:sldId id="261" r:id="rId6"/>
     <p:sldId id="264" r:id="rId7"/>
     <p:sldId id="265" r:id="rId8"/>
+    <p:sldId id="266" r:id="rId9"/>
   </p:sldIdLst>
   <p:sldSz cx="12192000" cy="6858000"/>
   <p:notesSz cx="6858000" cy="9144000"/>
@@ -267,7 +268,7 @@
           <a:p>
             <a:fld id="{CEFE0088-153F-0A45-B455-F3DE1BD3E33F}" type="datetimeFigureOut">
               <a:rPr lang="en-JP" smtClean="0"/>
-              <a:t>2020/05/08</a:t>
+              <a:t>2020/05/09</a:t>
             </a:fld>
             <a:endParaRPr lang="en-JP"/>
           </a:p>
@@ -467,7 +468,7 @@
           <a:p>
             <a:fld id="{CEFE0088-153F-0A45-B455-F3DE1BD3E33F}" type="datetimeFigureOut">
               <a:rPr lang="en-JP" smtClean="0"/>
-              <a:t>2020/05/08</a:t>
+              <a:t>2020/05/09</a:t>
             </a:fld>
             <a:endParaRPr lang="en-JP"/>
           </a:p>
@@ -677,7 +678,7 @@
           <a:p>
             <a:fld id="{CEFE0088-153F-0A45-B455-F3DE1BD3E33F}" type="datetimeFigureOut">
               <a:rPr lang="en-JP" smtClean="0"/>
-              <a:t>2020/05/08</a:t>
+              <a:t>2020/05/09</a:t>
             </a:fld>
             <a:endParaRPr lang="en-JP"/>
           </a:p>
@@ -877,7 +878,7 @@
           <a:p>
             <a:fld id="{CEFE0088-153F-0A45-B455-F3DE1BD3E33F}" type="datetimeFigureOut">
               <a:rPr lang="en-JP" smtClean="0"/>
-              <a:t>2020/05/08</a:t>
+              <a:t>2020/05/09</a:t>
             </a:fld>
             <a:endParaRPr lang="en-JP"/>
           </a:p>
@@ -1153,7 +1154,7 @@
           <a:p>
             <a:fld id="{CEFE0088-153F-0A45-B455-F3DE1BD3E33F}" type="datetimeFigureOut">
               <a:rPr lang="en-JP" smtClean="0"/>
-              <a:t>2020/05/08</a:t>
+              <a:t>2020/05/09</a:t>
             </a:fld>
             <a:endParaRPr lang="en-JP"/>
           </a:p>
@@ -1421,7 +1422,7 @@
           <a:p>
             <a:fld id="{CEFE0088-153F-0A45-B455-F3DE1BD3E33F}" type="datetimeFigureOut">
               <a:rPr lang="en-JP" smtClean="0"/>
-              <a:t>2020/05/08</a:t>
+              <a:t>2020/05/09</a:t>
             </a:fld>
             <a:endParaRPr lang="en-JP"/>
           </a:p>
@@ -1836,7 +1837,7 @@
           <a:p>
             <a:fld id="{CEFE0088-153F-0A45-B455-F3DE1BD3E33F}" type="datetimeFigureOut">
               <a:rPr lang="en-JP" smtClean="0"/>
-              <a:t>2020/05/08</a:t>
+              <a:t>2020/05/09</a:t>
             </a:fld>
             <a:endParaRPr lang="en-JP"/>
           </a:p>
@@ -1978,7 +1979,7 @@
           <a:p>
             <a:fld id="{CEFE0088-153F-0A45-B455-F3DE1BD3E33F}" type="datetimeFigureOut">
               <a:rPr lang="en-JP" smtClean="0"/>
-              <a:t>2020/05/08</a:t>
+              <a:t>2020/05/09</a:t>
             </a:fld>
             <a:endParaRPr lang="en-JP"/>
           </a:p>
@@ -2091,7 +2092,7 @@
           <a:p>
             <a:fld id="{CEFE0088-153F-0A45-B455-F3DE1BD3E33F}" type="datetimeFigureOut">
               <a:rPr lang="en-JP" smtClean="0"/>
-              <a:t>2020/05/08</a:t>
+              <a:t>2020/05/09</a:t>
             </a:fld>
             <a:endParaRPr lang="en-JP"/>
           </a:p>
@@ -2404,7 +2405,7 @@
           <a:p>
             <a:fld id="{CEFE0088-153F-0A45-B455-F3DE1BD3E33F}" type="datetimeFigureOut">
               <a:rPr lang="en-JP" smtClean="0"/>
-              <a:t>2020/05/08</a:t>
+              <a:t>2020/05/09</a:t>
             </a:fld>
             <a:endParaRPr lang="en-JP"/>
           </a:p>
@@ -2693,7 +2694,7 @@
           <a:p>
             <a:fld id="{CEFE0088-153F-0A45-B455-F3DE1BD3E33F}" type="datetimeFigureOut">
               <a:rPr lang="en-JP" smtClean="0"/>
-              <a:t>2020/05/08</a:t>
+              <a:t>2020/05/09</a:t>
             </a:fld>
             <a:endParaRPr lang="en-JP"/>
           </a:p>
@@ -2936,7 +2937,7 @@
           <a:p>
             <a:fld id="{CEFE0088-153F-0A45-B455-F3DE1BD3E33F}" type="datetimeFigureOut">
               <a:rPr lang="en-JP" smtClean="0"/>
-              <a:t>2020/05/08</a:t>
+              <a:t>2020/05/09</a:t>
             </a:fld>
             <a:endParaRPr lang="en-JP"/>
           </a:p>
@@ -11690,7 +11691,7 @@
                   <a:schemeClr val="tx1"/>
                 </a:solidFill>
               </a:rPr>
-              <a:t>M</a:t>
+              <a:t>m</a:t>
             </a:r>
             <a:r>
               <a:rPr lang="en-JP" dirty="0">
@@ -12734,6 +12735,36 @@
     <p:extLst>
       <p:ext uri="{BB962C8B-B14F-4D97-AF65-F5344CB8AC3E}">
         <p14:creationId xmlns:p14="http://schemas.microsoft.com/office/powerpoint/2010/main" val="2922386591"/>
+      </p:ext>
+    </p:extLst>
+  </p:cSld>
+  <p:clrMapOvr>
+    <a:masterClrMapping/>
+  </p:clrMapOvr>
+</p:sld>
+</file>
+
+<file path=ppt/slides/slide8.xml><?xml version="1.0" encoding="utf-8"?>
+<p:sld xmlns:a="http://schemas.openxmlformats.org/drawingml/2006/main" xmlns:r="http://schemas.openxmlformats.org/officeDocument/2006/relationships" xmlns:p="http://schemas.openxmlformats.org/presentationml/2006/main">
+  <p:cSld>
+    <p:spTree>
+      <p:nvGrpSpPr>
+        <p:cNvPr id="1" name=""/>
+        <p:cNvGrpSpPr/>
+        <p:nvPr/>
+      </p:nvGrpSpPr>
+      <p:grpSpPr>
+        <a:xfrm>
+          <a:off x="0" y="0"/>
+          <a:ext cx="0" cy="0"/>
+          <a:chOff x="0" y="0"/>
+          <a:chExt cx="0" cy="0"/>
+        </a:xfrm>
+      </p:grpSpPr>
+    </p:spTree>
+    <p:extLst>
+      <p:ext uri="{BB962C8B-B14F-4D97-AF65-F5344CB8AC3E}">
+        <p14:creationId xmlns:p14="http://schemas.microsoft.com/office/powerpoint/2010/main" val="2917624236"/>
       </p:ext>
     </p:extLst>
   </p:cSld>

</xml_diff>